<commit_message>
Fix lightweight java profiler reference
</commit_message>
<xml_diff>
--- a/project_presentation.pptx
+++ b/project_presentation.pptx
@@ -10,6 +10,7 @@
     <p:sldId id="258" r:id="rId4"/>
     <p:sldId id="259" r:id="rId5"/>
     <p:sldId id="260" r:id="rId6"/>
+    <p:sldId id="261" r:id="rId7"/>
   </p:sldIdLst>
   <p:sldSz cx="12192000" cy="6858000"/>
   <p:notesSz cx="6858000" cy="9144000"/>
@@ -122,6 +123,7 @@
             <p14:sldId id="258"/>
             <p14:sldId id="259"/>
             <p14:sldId id="260"/>
+            <p14:sldId id="261"/>
           </p14:sldIdLst>
         </p14:section>
       </p14:sectionLst>
@@ -6057,13 +6059,8 @@
           <a:p>
             <a:r>
               <a:rPr lang="en-US" dirty="0"/>
-              <a:t>At the end of the program (when enough results have been collected), experiments that indicate biggest throughput increases are highlighted as lines </a:t>
-            </a:r>
-            <a:r>
-              <a:rPr lang="en-US"/>
-              <a:t>for optimization</a:t>
-            </a:r>
-            <a:endParaRPr lang="en-US" dirty="0"/>
+              <a:t>At the end of the program (when enough results have been collected), experiments that indicate biggest throughput increases are highlighted as lines for optimization</a:t>
+            </a:r>
           </a:p>
           <a:p>
             <a:endParaRPr lang="en-US" dirty="0"/>
@@ -6074,6 +6071,150 @@
     <p:extLst>
       <p:ext uri="{BB962C8B-B14F-4D97-AF65-F5344CB8AC3E}">
         <p14:creationId xmlns:p14="http://schemas.microsoft.com/office/powerpoint/2010/main" val="1976209311"/>
+      </p:ext>
+    </p:extLst>
+  </p:cSld>
+  <p:clrMapOvr>
+    <a:masterClrMapping/>
+  </p:clrMapOvr>
+</p:sld>
+</file>
+
+<file path=ppt/slides/slide6.xml><?xml version="1.0" encoding="utf-8"?>
+<p:sld xmlns:a="http://schemas.openxmlformats.org/drawingml/2006/main" xmlns:r="http://schemas.openxmlformats.org/officeDocument/2006/relationships" xmlns:p="http://schemas.openxmlformats.org/presentationml/2006/main">
+  <p:cSld>
+    <p:spTree>
+      <p:nvGrpSpPr>
+        <p:cNvPr id="1" name=""/>
+        <p:cNvGrpSpPr/>
+        <p:nvPr/>
+      </p:nvGrpSpPr>
+      <p:grpSpPr>
+        <a:xfrm>
+          <a:off x="0" y="0"/>
+          <a:ext cx="0" cy="0"/>
+          <a:chOff x="0" y="0"/>
+          <a:chExt cx="0" cy="0"/>
+        </a:xfrm>
+      </p:grpSpPr>
+      <p:sp>
+        <p:nvSpPr>
+          <p:cNvPr id="4" name="Title 3"/>
+          <p:cNvSpPr>
+            <a:spLocks noGrp="1"/>
+          </p:cNvSpPr>
+          <p:nvPr>
+            <p:ph type="title"/>
+          </p:nvPr>
+        </p:nvSpPr>
+        <p:spPr/>
+        <p:txBody>
+          <a:bodyPr/>
+          <a:lstStyle/>
+          <a:p>
+            <a:r>
+              <a:rPr lang="en-US" dirty="0"/>
+              <a:t>Virtual Speedup visualization</a:t>
+            </a:r>
+          </a:p>
+        </p:txBody>
+      </p:sp>
+      <p:pic>
+        <p:nvPicPr>
+          <p:cNvPr id="7" name="Content Placeholder 6"/>
+          <p:cNvPicPr>
+            <a:picLocks noGrp="1" noChangeAspect="1"/>
+          </p:cNvPicPr>
+          <p:nvPr>
+            <p:ph idx="1"/>
+          </p:nvPr>
+        </p:nvPicPr>
+        <p:blipFill>
+          <a:blip r:embed="rId2"/>
+          <a:stretch>
+            <a:fillRect/>
+          </a:stretch>
+        </p:blipFill>
+        <p:spPr>
+          <a:xfrm>
+            <a:off x="6145823" y="319585"/>
+            <a:ext cx="4570535" cy="6282877"/>
+          </a:xfrm>
+        </p:spPr>
+      </p:pic>
+      <p:sp>
+        <p:nvSpPr>
+          <p:cNvPr id="6" name="Text Placeholder 5"/>
+          <p:cNvSpPr>
+            <a:spLocks noGrp="1"/>
+          </p:cNvSpPr>
+          <p:nvPr>
+            <p:ph type="body" sz="half" idx="2"/>
+          </p:nvPr>
+        </p:nvSpPr>
+        <p:spPr>
+          <a:xfrm>
+            <a:off x="235804" y="4800593"/>
+            <a:ext cx="3549121" cy="1828800"/>
+          </a:xfrm>
+        </p:spPr>
+        <p:txBody>
+          <a:bodyPr>
+            <a:normAutofit fontScale="92500"/>
+          </a:bodyPr>
+          <a:lstStyle/>
+          <a:p>
+            <a:r>
+              <a:rPr lang="en-US" dirty="0"/>
+              <a:t>Photo credit: Charlie </a:t>
+            </a:r>
+            <a:r>
+              <a:rPr lang="en-US" dirty="0" err="1"/>
+              <a:t>Curtsinger</a:t>
+            </a:r>
+            <a:r>
+              <a:rPr lang="en-US" dirty="0"/>
+              <a:t> and Emery Berger</a:t>
+            </a:r>
+          </a:p>
+          <a:p>
+            <a:endParaRPr lang="en-US" dirty="0"/>
+          </a:p>
+          <a:p>
+            <a:r>
+              <a:rPr lang="en-US" dirty="0">
+                <a:effectLst/>
+              </a:rPr>
+              <a:t>C. </a:t>
+            </a:r>
+            <a:r>
+              <a:rPr lang="en-US" dirty="0" err="1">
+                <a:effectLst/>
+              </a:rPr>
+              <a:t>Curtsinger</a:t>
+            </a:r>
+            <a:r>
+              <a:rPr lang="en-US" dirty="0">
+                <a:effectLst/>
+              </a:rPr>
+              <a:t>, E. Berger. COZ: Finding Code that Counts with Causal Profiling. </a:t>
+            </a:r>
+            <a:r>
+              <a:rPr lang="en-US" i="1" dirty="0">
+                <a:effectLst/>
+              </a:rPr>
+              <a:t>SOSP '15 ACM SIGOPS</a:t>
+            </a:r>
+            <a:endParaRPr lang="en-US" dirty="0">
+              <a:effectLst/>
+            </a:endParaRPr>
+          </a:p>
+        </p:txBody>
+      </p:sp>
+    </p:spTree>
+    <p:extLst>
+      <p:ext uri="{BB962C8B-B14F-4D97-AF65-F5344CB8AC3E}">
+        <p14:creationId xmlns:p14="http://schemas.microsoft.com/office/powerpoint/2010/main" val="1051421467"/>
       </p:ext>
     </p:extLst>
   </p:cSld>

</xml_diff>